<commit_message>
Add demo instructions to presentation
-Update verbiage about IBM Cloud use of Service Catalog
</commit_message>
<xml_diff>
--- a/presentation/kube_service_catalog_101.pptx
+++ b/presentation/kube_service_catalog_101.pptx
@@ -40,32 +40,33 @@
     <p:sldId id="285" r:id="rId34"/>
     <p:sldId id="286" r:id="rId35"/>
     <p:sldId id="287" r:id="rId36"/>
+    <p:sldId id="288" r:id="rId37"/>
   </p:sldIdLst>
   <p:sldSz cy="6858000" cx="12192000"/>
   <p:notesSz cx="9144000" cy="6858000"/>
   <p:embeddedFontLst>
     <p:embeddedFont>
       <p:font typeface="Permanent Marker"/>
-      <p:regular r:id="rId37"/>
+      <p:regular r:id="rId38"/>
     </p:embeddedFont>
     <p:embeddedFont>
       <p:font typeface="Helvetica Neue"/>
-      <p:bold r:id="rId38"/>
-      <p:boldItalic r:id="rId39"/>
+      <p:bold r:id="rId39"/>
+      <p:boldItalic r:id="rId40"/>
     </p:embeddedFont>
     <p:embeddedFont>
       <p:font typeface="Helvetica Neue Light"/>
-      <p:regular r:id="rId40"/>
-      <p:bold r:id="rId41"/>
-      <p:italic r:id="rId42"/>
-      <p:boldItalic r:id="rId43"/>
+      <p:regular r:id="rId41"/>
+      <p:bold r:id="rId42"/>
+      <p:italic r:id="rId43"/>
+      <p:boldItalic r:id="rId44"/>
     </p:embeddedFont>
     <p:embeddedFont>
       <p:font typeface="Roboto Mono"/>
-      <p:regular r:id="rId44"/>
-      <p:bold r:id="rId45"/>
-      <p:italic r:id="rId46"/>
-      <p:boldItalic r:id="rId47"/>
+      <p:regular r:id="rId45"/>
+      <p:bold r:id="rId46"/>
+      <p:italic r:id="rId47"/>
+      <p:boldItalic r:id="rId48"/>
     </p:embeddedFont>
   </p:embeddedFontLst>
   <p:defaultTextStyle>
@@ -3677,77 +3678,6 @@
       <p:sp>
         <p:nvSpPr>
           <p:cNvPr id="408" name="Shape 408"/>
-          <p:cNvSpPr txBox="1"/>
-          <p:nvPr>
-            <p:ph idx="1" type="body"/>
-          </p:nvPr>
-        </p:nvSpPr>
-        <p:spPr>
-          <a:xfrm>
-            <a:off x="914400" y="3300412"/>
-            <a:ext cx="7315200" cy="2700300"/>
-          </a:xfrm>
-          <a:prstGeom prst="rect">
-            <a:avLst/>
-          </a:prstGeom>
-        </p:spPr>
-        <p:txBody>
-          <a:bodyPr anchorCtr="0" anchor="t" bIns="91425" lIns="91425" spcFirstLastPara="1" rIns="91425" wrap="square" tIns="91425">
-            <a:noAutofit/>
-          </a:bodyPr>
-          <a:lstStyle/>
-          <a:p>
-            <a:pPr indent="0" lvl="0" marL="0">
-              <a:spcBef>
-                <a:spcPts val="0"/>
-              </a:spcBef>
-              <a:spcAft>
-                <a:spcPts val="0"/>
-              </a:spcAft>
-              <a:buNone/>
-            </a:pPr>
-            <a:r>
-              <a:rPr lang="en-US"/>
-              <a:t>//host swayr/psifos and swayr/kyalia on kube w/ service-catalog, add a cf-mysql broker to the service-catalog, provision a service, connect it to the apps</a:t>
-            </a:r>
-            <a:endParaRPr/>
-          </a:p>
-          <a:p>
-            <a:pPr indent="0" lvl="0" marL="0">
-              <a:spcBef>
-                <a:spcPts val="0"/>
-              </a:spcBef>
-              <a:spcAft>
-                <a:spcPts val="0"/>
-              </a:spcAft>
-              <a:buNone/>
-            </a:pPr>
-            <a:r>
-              <a:t/>
-            </a:r>
-            <a:endParaRPr/>
-          </a:p>
-          <a:p>
-            <a:pPr indent="0" lvl="0" marL="0" rtl="0">
-              <a:spcBef>
-                <a:spcPts val="0"/>
-              </a:spcBef>
-              <a:spcAft>
-                <a:spcPts val="0"/>
-              </a:spcAft>
-              <a:buNone/>
-            </a:pPr>
-            <a:r>
-              <a:rPr lang="en-US"/>
-              <a:t>This is the same demo as Swetha and I gave at Index, only with the apps running on Kubernetes instead of CF</a:t>
-            </a:r>
-            <a:endParaRPr/>
-          </a:p>
-        </p:txBody>
-      </p:sp>
-      <p:sp>
-        <p:nvSpPr>
-          <p:cNvPr id="409" name="Shape 409"/>
           <p:cNvSpPr/>
           <p:nvPr>
             <p:ph idx="2" type="sldImg"/>
@@ -3778,6 +3708,89 @@
             </a:pathLst>
           </a:custGeom>
         </p:spPr>
+      </p:sp>
+      <p:sp>
+        <p:nvSpPr>
+          <p:cNvPr id="409" name="Shape 409"/>
+          <p:cNvSpPr txBox="1"/>
+          <p:nvPr>
+            <p:ph idx="1" type="body"/>
+          </p:nvPr>
+        </p:nvSpPr>
+        <p:spPr>
+          <a:xfrm>
+            <a:off x="914400" y="3300412"/>
+            <a:ext cx="7315200" cy="2700300"/>
+          </a:xfrm>
+          <a:prstGeom prst="rect">
+            <a:avLst/>
+          </a:prstGeom>
+        </p:spPr>
+        <p:txBody>
+          <a:bodyPr anchorCtr="0" anchor="t" bIns="91425" lIns="91425" spcFirstLastPara="1" rIns="91425" wrap="square" tIns="91425">
+            <a:noAutofit/>
+          </a:bodyPr>
+          <a:lstStyle/>
+          <a:p>
+            <a:pPr indent="0" lvl="0" marL="0">
+              <a:spcBef>
+                <a:spcPts val="0"/>
+              </a:spcBef>
+              <a:spcAft>
+                <a:spcPts val="0"/>
+              </a:spcAft>
+              <a:buNone/>
+            </a:pPr>
+            <a:r>
+              <a:t/>
+            </a:r>
+            <a:endParaRPr/>
+          </a:p>
+        </p:txBody>
+      </p:sp>
+      <p:sp>
+        <p:nvSpPr>
+          <p:cNvPr id="410" name="Shape 410"/>
+          <p:cNvSpPr txBox="1"/>
+          <p:nvPr>
+            <p:ph idx="12" type="sldNum"/>
+          </p:nvPr>
+        </p:nvSpPr>
+        <p:spPr>
+          <a:xfrm>
+            <a:off x="5179484" y="6513910"/>
+            <a:ext cx="3962400" cy="344100"/>
+          </a:xfrm>
+          <a:prstGeom prst="rect">
+            <a:avLst/>
+          </a:prstGeom>
+        </p:spPr>
+        <p:txBody>
+          <a:bodyPr anchorCtr="0" anchor="b" bIns="45700" lIns="91425" spcFirstLastPara="1" rIns="91425" wrap="square" tIns="45700">
+            <a:noAutofit/>
+          </a:bodyPr>
+          <a:lstStyle/>
+          <a:p>
+            <a:pPr indent="0" lvl="0" marL="0">
+              <a:spcBef>
+                <a:spcPts val="0"/>
+              </a:spcBef>
+              <a:spcAft>
+                <a:spcPts val="0"/>
+              </a:spcAft>
+              <a:buClr>
+                <a:srgbClr val="000000"/>
+              </a:buClr>
+              <a:buFont typeface="Arial"/>
+              <a:buNone/>
+            </a:pPr>
+            <a:fld id="{00000000-1234-1234-1234-123412341234}" type="slidenum">
+              <a:rPr lang="en-US"/>
+              <a:t>‹#›</a:t>
+            </a:fld>
+            <a:endParaRPr/>
+          </a:p>
+        </p:txBody>
       </p:sp>
     </p:spTree>
   </p:cSld>
@@ -3922,7 +3935,7 @@
   <p:cSld>
     <p:spTree>
       <p:nvGrpSpPr>
-        <p:cNvPr id="413" name="Shape 413"/>
+        <p:cNvPr id="415" name="Shape 415"/>
         <p:cNvGrpSpPr/>
         <p:nvPr/>
       </p:nvGrpSpPr>
@@ -3936,7 +3949,7 @@
       </p:grpSpPr>
       <p:sp>
         <p:nvSpPr>
-          <p:cNvPr id="414" name="Shape 414"/>
+          <p:cNvPr id="416" name="Shape 416"/>
           <p:cNvSpPr txBox="1"/>
           <p:nvPr>
             <p:ph idx="1" type="body"/>
@@ -3957,6 +3970,483 @@
           </a:bodyPr>
           <a:lstStyle/>
           <a:p>
+            <a:pPr indent="0" lvl="0" marL="0">
+              <a:spcBef>
+                <a:spcPts val="0"/>
+              </a:spcBef>
+              <a:spcAft>
+                <a:spcPts val="0"/>
+              </a:spcAft>
+              <a:buNone/>
+            </a:pPr>
+            <a:r>
+              <a:rPr lang="en-US"/>
+              <a:t>Demo the use of guestbook with minibroker to provision a redis backing store</a:t>
+            </a:r>
+            <a:endParaRPr/>
+          </a:p>
+          <a:p>
+            <a:pPr indent="0" lvl="0" marL="0">
+              <a:spcBef>
+                <a:spcPts val="0"/>
+              </a:spcBef>
+              <a:spcAft>
+                <a:spcPts val="0"/>
+              </a:spcAft>
+              <a:buNone/>
+            </a:pPr>
+            <a:r>
+              <a:rPr lang="en-US"/>
+              <a:t>guestbook: </a:t>
+            </a:r>
+            <a:r>
+              <a:rPr lang="en-US" u="sng">
+                <a:solidFill>
+                  <a:schemeClr val="hlink"/>
+                </a:solidFill>
+                <a:hlinkClick r:id="rId2"/>
+              </a:rPr>
+              <a:t>https://github.com/ibm/guestbook</a:t>
+            </a:r>
+            <a:endParaRPr/>
+          </a:p>
+          <a:p>
+            <a:pPr indent="0" lvl="0" marL="0">
+              <a:spcBef>
+                <a:spcPts val="0"/>
+              </a:spcBef>
+              <a:spcAft>
+                <a:spcPts val="0"/>
+              </a:spcAft>
+              <a:buNone/>
+            </a:pPr>
+            <a:r>
+              <a:rPr lang="en-US"/>
+              <a:t>minibroker: </a:t>
+            </a:r>
+            <a:r>
+              <a:rPr lang="en-US" u="sng">
+                <a:solidFill>
+                  <a:schemeClr val="hlink"/>
+                </a:solidFill>
+                <a:hlinkClick r:id="rId3"/>
+              </a:rPr>
+              <a:t>https://github.com/osbkit/minibroker</a:t>
+            </a:r>
+            <a:endParaRPr/>
+          </a:p>
+          <a:p>
+            <a:pPr indent="0" lvl="0" marL="0">
+              <a:spcBef>
+                <a:spcPts val="0"/>
+              </a:spcBef>
+              <a:spcAft>
+                <a:spcPts val="0"/>
+              </a:spcAft>
+              <a:buNone/>
+            </a:pPr>
+            <a:r>
+              <a:t/>
+            </a:r>
+            <a:endParaRPr/>
+          </a:p>
+          <a:p>
+            <a:pPr indent="0" lvl="0" marL="0">
+              <a:spcBef>
+                <a:spcPts val="0"/>
+              </a:spcBef>
+              <a:spcAft>
+                <a:spcPts val="0"/>
+              </a:spcAft>
+              <a:buNone/>
+            </a:pPr>
+            <a:r>
+              <a:rPr lang="en-US"/>
+              <a:t>If using the IBM Kubernetes Serivce, you need to provision a Persistant Volume on Kube as detailed in the Lab0 setup in the workshop here:</a:t>
+            </a:r>
+            <a:endParaRPr/>
+          </a:p>
+          <a:p>
+            <a:pPr indent="0" lvl="0" marL="0">
+              <a:spcBef>
+                <a:spcPts val="0"/>
+              </a:spcBef>
+              <a:spcAft>
+                <a:spcPts val="0"/>
+              </a:spcAft>
+              <a:buNone/>
+            </a:pPr>
+            <a:r>
+              <a:rPr lang="en-US"/>
+              <a:t>https://github.com/IBM/svccat/tree/master/workshop/Lab0</a:t>
+            </a:r>
+            <a:endParaRPr/>
+          </a:p>
+          <a:p>
+            <a:pPr indent="0" lvl="0" marL="0">
+              <a:spcBef>
+                <a:spcPts val="0"/>
+              </a:spcBef>
+              <a:spcAft>
+                <a:spcPts val="0"/>
+              </a:spcAft>
+              <a:buNone/>
+            </a:pPr>
+            <a:r>
+              <a:t/>
+            </a:r>
+            <a:endParaRPr/>
+          </a:p>
+          <a:p>
+            <a:pPr indent="0" lvl="0" marL="0">
+              <a:spcBef>
+                <a:spcPts val="0"/>
+              </a:spcBef>
+              <a:spcAft>
+                <a:spcPts val="0"/>
+              </a:spcAft>
+              <a:buNone/>
+            </a:pPr>
+            <a:r>
+              <a:rPr lang="en-US"/>
+              <a:t>Install minibroker with Helm:</a:t>
+            </a:r>
+            <a:endParaRPr/>
+          </a:p>
+          <a:p>
+            <a:pPr indent="0" lvl="0" marL="0">
+              <a:spcBef>
+                <a:spcPts val="0"/>
+              </a:spcBef>
+              <a:spcAft>
+                <a:spcPts val="0"/>
+              </a:spcAft>
+              <a:buClr>
+                <a:schemeClr val="dk1"/>
+              </a:buClr>
+              <a:buSzPts val="1100"/>
+              <a:buFont typeface="Arial"/>
+              <a:buNone/>
+            </a:pPr>
+            <a:r>
+              <a:rPr lang="en-US"/>
+              <a:t>$ </a:t>
+            </a:r>
+            <a:r>
+              <a:rPr lang="en-US"/>
+              <a:t>helm repo add minibroker https://minibroker.blob.core.windows.net/charts</a:t>
+            </a:r>
+            <a:br>
+              <a:rPr lang="en-US"/>
+            </a:br>
+            <a:r>
+              <a:rPr lang="en-US"/>
+              <a:t>$ helm install --name minibroker --namespace minibroker minibroker/minibroker</a:t>
+            </a:r>
+            <a:endParaRPr/>
+          </a:p>
+          <a:p>
+            <a:pPr indent="0" lvl="0" marL="0">
+              <a:spcBef>
+                <a:spcPts val="0"/>
+              </a:spcBef>
+              <a:spcAft>
+                <a:spcPts val="0"/>
+              </a:spcAft>
+              <a:buNone/>
+            </a:pPr>
+            <a:r>
+              <a:t/>
+            </a:r>
+            <a:endParaRPr/>
+          </a:p>
+          <a:p>
+            <a:pPr indent="0" lvl="0" marL="0">
+              <a:spcBef>
+                <a:spcPts val="0"/>
+              </a:spcBef>
+              <a:spcAft>
+                <a:spcPts val="0"/>
+              </a:spcAft>
+              <a:buNone/>
+            </a:pPr>
+            <a:r>
+              <a:t/>
+            </a:r>
+            <a:endParaRPr/>
+          </a:p>
+          <a:p>
+            <a:pPr indent="0" lvl="0" marL="0">
+              <a:spcBef>
+                <a:spcPts val="0"/>
+              </a:spcBef>
+              <a:spcAft>
+                <a:spcPts val="0"/>
+              </a:spcAft>
+              <a:buNone/>
+            </a:pPr>
+            <a:r>
+              <a:rPr lang="en-US"/>
+              <a:t>Run a Guestbook deployment with</a:t>
+            </a:r>
+            <a:endParaRPr/>
+          </a:p>
+          <a:p>
+            <a:pPr indent="0" lvl="0" marL="0">
+              <a:spcBef>
+                <a:spcPts val="0"/>
+              </a:spcBef>
+              <a:spcAft>
+                <a:spcPts val="0"/>
+              </a:spcAft>
+              <a:buNone/>
+            </a:pPr>
+            <a:r>
+              <a:rPr lang="en-US"/>
+              <a:t>$ kubectl run guestbook --image=</a:t>
+            </a:r>
+            <a:r>
+              <a:rPr lang="en-US"/>
+              <a:t>--image=ibmcom/guestbook:v1</a:t>
+            </a:r>
+            <a:endParaRPr/>
+          </a:p>
+          <a:p>
+            <a:pPr indent="0" lvl="0" marL="0">
+              <a:spcBef>
+                <a:spcPts val="0"/>
+              </a:spcBef>
+              <a:spcAft>
+                <a:spcPts val="0"/>
+              </a:spcAft>
+              <a:buNone/>
+            </a:pPr>
+            <a:r>
+              <a:rPr lang="en-US"/>
+              <a:t>$ kubectl expose deployment guestbook --type="NodePort" --port=3000</a:t>
+            </a:r>
+            <a:endParaRPr/>
+          </a:p>
+          <a:p>
+            <a:pPr indent="0" lvl="0" marL="0">
+              <a:spcBef>
+                <a:spcPts val="0"/>
+              </a:spcBef>
+              <a:spcAft>
+                <a:spcPts val="0"/>
+              </a:spcAft>
+              <a:buNone/>
+            </a:pPr>
+            <a:r>
+              <a:t/>
+            </a:r>
+            <a:endParaRPr/>
+          </a:p>
+          <a:p>
+            <a:pPr indent="0" lvl="0" marL="0">
+              <a:spcBef>
+                <a:spcPts val="0"/>
+              </a:spcBef>
+              <a:spcAft>
+                <a:spcPts val="0"/>
+              </a:spcAft>
+              <a:buNone/>
+            </a:pPr>
+            <a:r>
+              <a:rPr lang="en-US"/>
+              <a:t>Go to the webpage for your redis application and show it storing state locally by entering some data, then kicking</a:t>
+            </a:r>
+            <a:endParaRPr/>
+          </a:p>
+          <a:p>
+            <a:pPr indent="0" lvl="0" marL="0">
+              <a:spcBef>
+                <a:spcPts val="0"/>
+              </a:spcBef>
+              <a:spcAft>
+                <a:spcPts val="0"/>
+              </a:spcAft>
+              <a:buNone/>
+            </a:pPr>
+            <a:r>
+              <a:rPr lang="en-US"/>
+              <a:t>the Pod and having the data disappear.</a:t>
+            </a:r>
+            <a:endParaRPr/>
+          </a:p>
+          <a:p>
+            <a:pPr indent="0" lvl="0" marL="0">
+              <a:spcBef>
+                <a:spcPts val="0"/>
+              </a:spcBef>
+              <a:spcAft>
+                <a:spcPts val="0"/>
+              </a:spcAft>
+              <a:buNone/>
+            </a:pPr>
+            <a:r>
+              <a:t/>
+            </a:r>
+            <a:endParaRPr/>
+          </a:p>
+          <a:p>
+            <a:pPr indent="0" lvl="0" marL="0">
+              <a:spcBef>
+                <a:spcPts val="0"/>
+              </a:spcBef>
+              <a:spcAft>
+                <a:spcPts val="0"/>
+              </a:spcAft>
+              <a:buNone/>
+            </a:pPr>
+            <a:r>
+              <a:rPr lang="en-US"/>
+              <a:t>Provision and bind a redis service with:</a:t>
+            </a:r>
+            <a:endParaRPr/>
+          </a:p>
+          <a:p>
+            <a:pPr indent="0" lvl="0" marL="0">
+              <a:spcBef>
+                <a:spcPts val="0"/>
+              </a:spcBef>
+              <a:spcAft>
+                <a:spcPts val="0"/>
+              </a:spcAft>
+              <a:buNone/>
+            </a:pPr>
+            <a:r>
+              <a:rPr lang="en-US"/>
+              <a:t>$ svcat provision myredis --class=myredis --plan=4-0-9</a:t>
+            </a:r>
+            <a:endParaRPr/>
+          </a:p>
+          <a:p>
+            <a:pPr indent="0" lvl="0" marL="0">
+              <a:spcBef>
+                <a:spcPts val="0"/>
+              </a:spcBef>
+              <a:spcAft>
+                <a:spcPts val="0"/>
+              </a:spcAft>
+              <a:buNone/>
+            </a:pPr>
+            <a:r>
+              <a:rPr lang="en-US"/>
+              <a:t>$ svcat bind myredis</a:t>
+            </a:r>
+            <a:endParaRPr/>
+          </a:p>
+          <a:p>
+            <a:pPr indent="0" lvl="0" marL="0">
+              <a:spcBef>
+                <a:spcPts val="0"/>
+              </a:spcBef>
+              <a:spcAft>
+                <a:spcPts val="0"/>
+              </a:spcAft>
+              <a:buNone/>
+            </a:pPr>
+            <a:r>
+              <a:t/>
+            </a:r>
+            <a:endParaRPr/>
+          </a:p>
+          <a:p>
+            <a:pPr indent="0" lvl="0" marL="0">
+              <a:spcBef>
+                <a:spcPts val="0"/>
+              </a:spcBef>
+              <a:spcAft>
+                <a:spcPts val="0"/>
+              </a:spcAft>
+              <a:buNone/>
+            </a:pPr>
+            <a:r>
+              <a:rPr lang="en-US"/>
+              <a:t>Then, insert the values from the secret into your deployment with kube edit as detailed in Lab5: </a:t>
+            </a:r>
+            <a:endParaRPr/>
+          </a:p>
+          <a:p>
+            <a:pPr indent="0" lvl="0" marL="0">
+              <a:spcBef>
+                <a:spcPts val="0"/>
+              </a:spcBef>
+              <a:spcAft>
+                <a:spcPts val="0"/>
+              </a:spcAft>
+              <a:buNone/>
+            </a:pPr>
+            <a:r>
+              <a:rPr lang="en-US"/>
+              <a:t>https://github.com/IBM/svccat/tree/master/workshop/Lab5</a:t>
+            </a:r>
+            <a:endParaRPr/>
+          </a:p>
+          <a:p>
+            <a:pPr indent="0" lvl="0" marL="0">
+              <a:spcBef>
+                <a:spcPts val="0"/>
+              </a:spcBef>
+              <a:spcAft>
+                <a:spcPts val="0"/>
+              </a:spcAft>
+              <a:buNone/>
+            </a:pPr>
+            <a:r>
+              <a:t/>
+            </a:r>
+            <a:endParaRPr/>
+          </a:p>
+          <a:p>
+            <a:pPr indent="0" lvl="0" marL="0">
+              <a:spcBef>
+                <a:spcPts val="0"/>
+              </a:spcBef>
+              <a:spcAft>
+                <a:spcPts val="0"/>
+              </a:spcAft>
+              <a:buNone/>
+            </a:pPr>
+            <a:r>
+              <a:t/>
+            </a:r>
+            <a:endParaRPr/>
+          </a:p>
+          <a:p>
+            <a:pPr indent="0" lvl="0" marL="0">
+              <a:spcBef>
+                <a:spcPts val="0"/>
+              </a:spcBef>
+              <a:spcAft>
+                <a:spcPts val="0"/>
+              </a:spcAft>
+              <a:buNone/>
+            </a:pPr>
+            <a:r>
+              <a:rPr lang="en-US"/>
+              <a:t>Then kick the Guestbook pod, go back to your Guestbook webpage and insert some data. This data should remain if you</a:t>
+            </a:r>
+            <a:endParaRPr/>
+          </a:p>
+          <a:p>
+            <a:pPr indent="0" lvl="0" marL="0">
+              <a:spcBef>
+                <a:spcPts val="0"/>
+              </a:spcBef>
+              <a:spcAft>
+                <a:spcPts val="0"/>
+              </a:spcAft>
+              <a:buNone/>
+            </a:pPr>
+            <a:r>
+              <a:rPr lang="en-US"/>
+              <a:t>kick the Guestbook pod, or even delete the Guestbook deployment entirely and recreate it.</a:t>
+            </a:r>
+            <a:endParaRPr/>
+          </a:p>
+          <a:p>
             <a:pPr indent="0" lvl="0" marL="0" rtl="0">
               <a:spcBef>
                 <a:spcPts val="0"/>
@@ -3967,8 +4457,7 @@
               <a:buNone/>
             </a:pPr>
             <a:r>
-              <a:rPr lang="en-US"/>
-              <a:t>So that is Kubernetes Service-Catalog. Currently it’s an incubator project in Alpha, but it’s rapidly approaching a Beta release.</a:t>
+              <a:t/>
             </a:r>
             <a:endParaRPr/>
           </a:p>
@@ -3976,7 +4465,7 @@
       </p:sp>
       <p:sp>
         <p:nvSpPr>
-          <p:cNvPr id="415" name="Shape 415"/>
+          <p:cNvPr id="417" name="Shape 417"/>
           <p:cNvSpPr/>
           <p:nvPr>
             <p:ph idx="2" type="sldImg"/>
@@ -4021,7 +4510,7 @@
   <p:cSld>
     <p:spTree>
       <p:nvGrpSpPr>
-        <p:cNvPr id="420" name="Shape 420"/>
+        <p:cNvPr id="421" name="Shape 421"/>
         <p:cNvGrpSpPr/>
         <p:nvPr/>
       </p:nvGrpSpPr>
@@ -4035,7 +4524,7 @@
       </p:grpSpPr>
       <p:sp>
         <p:nvSpPr>
-          <p:cNvPr id="421" name="Shape 421"/>
+          <p:cNvPr id="422" name="Shape 422"/>
           <p:cNvSpPr txBox="1"/>
           <p:nvPr>
             <p:ph idx="1" type="body"/>
@@ -4067,7 +4556,7 @@
             </a:pPr>
             <a:r>
               <a:rPr lang="en-US"/>
-              <a:t>Internally, we are already using Service-Catalog for IBM Cloud Private. The Container Service on the public IBM Cloud uses a custom in-house implementation of the Open Service Broker API that works for Docker, Cloud Foundry, and Kubernetes. This allows us share service instances between applications  running on the different parts of the platform, which is kinda cool.</a:t>
+              <a:t>So that is Kubernetes Service-Catalog. Currently it’s an incubator project in Alpha, but it’s rapidly approaching a Beta release.</a:t>
             </a:r>
             <a:endParaRPr/>
           </a:p>
@@ -4075,7 +4564,7 @@
       </p:sp>
       <p:sp>
         <p:nvSpPr>
-          <p:cNvPr id="422" name="Shape 422"/>
+          <p:cNvPr id="423" name="Shape 423"/>
           <p:cNvSpPr/>
           <p:nvPr>
             <p:ph idx="2" type="sldImg"/>
@@ -4120,7 +4609,7 @@
   <p:cSld>
     <p:spTree>
       <p:nvGrpSpPr>
-        <p:cNvPr id="427" name="Shape 427"/>
+        <p:cNvPr id="428" name="Shape 428"/>
         <p:cNvGrpSpPr/>
         <p:nvPr/>
       </p:nvGrpSpPr>
@@ -4134,7 +4623,7 @@
       </p:grpSpPr>
       <p:sp>
         <p:nvSpPr>
-          <p:cNvPr id="428" name="Shape 428"/>
+          <p:cNvPr id="429" name="Shape 429"/>
           <p:cNvSpPr txBox="1"/>
           <p:nvPr>
             <p:ph idx="1" type="body"/>
@@ -4165,7 +4654,8 @@
               <a:buNone/>
             </a:pPr>
             <a:r>
-              <a:t/>
+              <a:rPr lang="en-US"/>
+              <a:t>Internally, we are already using Service-Catalog for IBM Cloud Private. The Container Service on the public IBM Cloud uses a custom in-house implementation of the Open Service Broker API that works for Docker, Cloud Foundry, and Kubernetes. This allows us share service instances between applications  running on the different parts of the platform, which is kinda cool.</a:t>
             </a:r>
             <a:endParaRPr/>
           </a:p>
@@ -4173,7 +4663,105 @@
       </p:sp>
       <p:sp>
         <p:nvSpPr>
-          <p:cNvPr id="429" name="Shape 429"/>
+          <p:cNvPr id="430" name="Shape 430"/>
+          <p:cNvSpPr/>
+          <p:nvPr>
+            <p:ph idx="2" type="sldImg"/>
+          </p:nvPr>
+        </p:nvSpPr>
+        <p:spPr>
+          <a:xfrm>
+            <a:off x="2514600" y="857250"/>
+            <a:ext cx="4114800" cy="2314500"/>
+          </a:xfrm>
+          <a:custGeom>
+            <a:pathLst>
+              <a:path extrusionOk="0" h="120000" w="120000">
+                <a:moveTo>
+                  <a:pt x="0" y="0"/>
+                </a:moveTo>
+                <a:lnTo>
+                  <a:pt x="120000" y="0"/>
+                </a:lnTo>
+                <a:lnTo>
+                  <a:pt x="120000" y="120000"/>
+                </a:lnTo>
+                <a:lnTo>
+                  <a:pt x="0" y="120000"/>
+                </a:lnTo>
+                <a:close/>
+              </a:path>
+            </a:pathLst>
+          </a:custGeom>
+        </p:spPr>
+      </p:sp>
+    </p:spTree>
+  </p:cSld>
+  <p:clrMapOvr>
+    <a:masterClrMapping/>
+  </p:clrMapOvr>
+</p:notes>
+</file>
+
+<file path=ppt/notesSlides/notesSlide33.xml><?xml version="1.0" encoding="utf-8"?>
+<p:notes xmlns:a="http://schemas.openxmlformats.org/drawingml/2006/main" xmlns:r="http://schemas.openxmlformats.org/officeDocument/2006/relationships" xmlns:mc="http://schemas.openxmlformats.org/markup-compatibility/2006" xmlns:mv="urn:schemas-microsoft-com:mac:vml" xmlns:p="http://schemas.openxmlformats.org/presentationml/2006/main" xmlns:c="http://schemas.openxmlformats.org/drawingml/2006/chart" xmlns:dgm="http://schemas.openxmlformats.org/drawingml/2006/diagram" xmlns:o="urn:schemas-microsoft-com:office:office" xmlns:v="urn:schemas-microsoft-com:vml" xmlns:pvml="urn:schemas-microsoft-com:office:powerpoint" xmlns:com="http://schemas.openxmlformats.org/drawingml/2006/compatibility" xmlns:p14="http://schemas.microsoft.com/office/powerpoint/2010/main" xmlns:p15="http://schemas.microsoft.com/office/powerpoint/2012/main" showMasterPhAnim="0" showMasterSp="0">
+  <p:cSld>
+    <p:spTree>
+      <p:nvGrpSpPr>
+        <p:cNvPr id="435" name="Shape 435"/>
+        <p:cNvGrpSpPr/>
+        <p:nvPr/>
+      </p:nvGrpSpPr>
+      <p:grpSpPr>
+        <a:xfrm>
+          <a:off x="0" y="0"/>
+          <a:ext cx="0" cy="0"/>
+          <a:chOff x="0" y="0"/>
+          <a:chExt cx="0" cy="0"/>
+        </a:xfrm>
+      </p:grpSpPr>
+      <p:sp>
+        <p:nvSpPr>
+          <p:cNvPr id="436" name="Shape 436"/>
+          <p:cNvSpPr txBox="1"/>
+          <p:nvPr>
+            <p:ph idx="1" type="body"/>
+          </p:nvPr>
+        </p:nvSpPr>
+        <p:spPr>
+          <a:xfrm>
+            <a:off x="914400" y="3300412"/>
+            <a:ext cx="7315200" cy="2700300"/>
+          </a:xfrm>
+          <a:prstGeom prst="rect">
+            <a:avLst/>
+          </a:prstGeom>
+        </p:spPr>
+        <p:txBody>
+          <a:bodyPr anchorCtr="0" anchor="t" bIns="91425" lIns="91425" spcFirstLastPara="1" rIns="91425" wrap="square" tIns="91425">
+            <a:noAutofit/>
+          </a:bodyPr>
+          <a:lstStyle/>
+          <a:p>
+            <a:pPr indent="0" lvl="0" marL="0" rtl="0">
+              <a:spcBef>
+                <a:spcPts val="0"/>
+              </a:spcBef>
+              <a:spcAft>
+                <a:spcPts val="0"/>
+              </a:spcAft>
+              <a:buNone/>
+            </a:pPr>
+            <a:r>
+              <a:t/>
+            </a:r>
+            <a:endParaRPr/>
+          </a:p>
+        </p:txBody>
+      </p:sp>
+      <p:sp>
+        <p:nvSpPr>
+          <p:cNvPr id="437" name="Shape 437"/>
           <p:cNvSpPr/>
           <p:nvPr>
             <p:ph idx="2" type="sldImg"/>
@@ -30901,7 +31489,7 @@
   <p:cSld>
     <p:spTree>
       <p:nvGrpSpPr>
-        <p:cNvPr id="410" name="Shape 410"/>
+        <p:cNvPr id="411" name="Shape 411"/>
         <p:cNvGrpSpPr/>
         <p:nvPr/>
       </p:nvGrpSpPr>
@@ -30915,7 +31503,7 @@
       </p:grpSpPr>
       <p:sp>
         <p:nvSpPr>
-          <p:cNvPr id="411" name="Shape 411"/>
+          <p:cNvPr id="412" name="Shape 412"/>
           <p:cNvSpPr txBox="1"/>
           <p:nvPr>
             <p:ph type="title"/>
@@ -30929,37 +31517,25 @@
           <a:prstGeom prst="rect">
             <a:avLst/>
           </a:prstGeom>
-          <a:noFill/>
-          <a:ln>
-            <a:noFill/>
-          </a:ln>
         </p:spPr>
         <p:txBody>
-          <a:bodyPr anchorCtr="0" anchor="ctr" bIns="45700" lIns="91425" spcFirstLastPara="1" rIns="91425" wrap="square" tIns="45700">
+          <a:bodyPr anchorCtr="0" anchor="ctr" bIns="91425" lIns="91425" spcFirstLastPara="1" rIns="91425" wrap="square" tIns="91425">
             <a:noAutofit/>
           </a:bodyPr>
           <a:lstStyle/>
           <a:p>
-            <a:pPr indent="0" lvl="0" marL="0" marR="0" rtl="0" algn="l">
-              <a:lnSpc>
-                <a:spcPct val="90000"/>
-              </a:lnSpc>
-              <a:spcBef>
-                <a:spcPts val="0"/>
-              </a:spcBef>
-              <a:spcAft>
-                <a:spcPts val="0"/>
-              </a:spcAft>
-              <a:buClr>
-                <a:schemeClr val="lt1"/>
-              </a:buClr>
-              <a:buSzPts val="4400"/>
-              <a:buFont typeface="Calibri"/>
+            <a:pPr indent="0" lvl="0" marL="0">
+              <a:spcBef>
+                <a:spcPts val="0"/>
+              </a:spcBef>
+              <a:spcAft>
+                <a:spcPts val="0"/>
+              </a:spcAft>
               <a:buNone/>
             </a:pPr>
             <a:r>
               <a:rPr lang="en-US"/>
-              <a:t>Demo</a:t>
+              <a:t>Kubernetes Service Lifecycle</a:t>
             </a:r>
             <a:endParaRPr/>
           </a:p>
@@ -30967,7 +31543,65 @@
       </p:sp>
       <p:sp>
         <p:nvSpPr>
-          <p:cNvPr id="412" name="Shape 412"/>
+          <p:cNvPr id="413" name="Shape 413"/>
+          <p:cNvSpPr txBox="1"/>
+          <p:nvPr>
+            <p:ph idx="1" type="body"/>
+          </p:nvPr>
+        </p:nvSpPr>
+        <p:spPr>
+          <a:xfrm>
+            <a:off x="457200" y="1447800"/>
+            <a:ext cx="11353800" cy="4953000"/>
+          </a:xfrm>
+          <a:prstGeom prst="rect">
+            <a:avLst/>
+          </a:prstGeom>
+        </p:spPr>
+        <p:txBody>
+          <a:bodyPr anchorCtr="0" anchor="t" bIns="91425" lIns="91425" spcFirstLastPara="1" rIns="91425" wrap="square" tIns="91425">
+            <a:noAutofit/>
+          </a:bodyPr>
+          <a:lstStyle/>
+          <a:p>
+            <a:pPr indent="-406400" lvl="0" marL="457200" rtl="0">
+              <a:spcBef>
+                <a:spcPts val="1000"/>
+              </a:spcBef>
+              <a:spcAft>
+                <a:spcPts val="0"/>
+              </a:spcAft>
+              <a:buSzPts val="2800"/>
+              <a:buChar char="•"/>
+            </a:pPr>
+            <a:r>
+              <a:rPr lang="en-US"/>
+              <a:t>Hardcode credentials into your app</a:t>
+            </a:r>
+            <a:endParaRPr/>
+          </a:p>
+          <a:p>
+            <a:pPr indent="-406400" lvl="0" marL="457200">
+              <a:spcBef>
+                <a:spcPts val="0"/>
+              </a:spcBef>
+              <a:spcAft>
+                <a:spcPts val="0"/>
+              </a:spcAft>
+              <a:buSzPts val="2800"/>
+              <a:buChar char="•"/>
+            </a:pPr>
+            <a:r>
+              <a:rPr lang="en-US"/>
+              <a:t>Put credentials into a secret</a:t>
+            </a:r>
+            <a:endParaRPr/>
+          </a:p>
+        </p:txBody>
+      </p:sp>
+      <p:sp>
+        <p:nvSpPr>
+          <p:cNvPr id="414" name="Shape 414"/>
           <p:cNvSpPr txBox="1"/>
           <p:nvPr>
             <p:ph idx="12" type="sldNum"/>
@@ -30981,10 +31615,6 @@
           <a:prstGeom prst="rect">
             <a:avLst/>
           </a:prstGeom>
-          <a:noFill/>
-          <a:ln>
-            <a:noFill/>
-          </a:ln>
         </p:spPr>
         <p:txBody>
           <a:bodyPr anchorCtr="0" anchor="ctr" bIns="45700" lIns="91425" spcFirstLastPara="1" rIns="91425" wrap="square" tIns="45700">
@@ -30992,36 +31622,24 @@
           </a:bodyPr>
           <a:lstStyle/>
           <a:p>
-            <a:pPr indent="0" lvl="0" marL="0" marR="0" rtl="0" algn="r">
-              <a:spcBef>
-                <a:spcPts val="0"/>
-              </a:spcBef>
-              <a:spcAft>
-                <a:spcPts val="0"/>
-              </a:spcAft>
+            <a:pPr indent="0" lvl="0" marL="0">
+              <a:spcBef>
+                <a:spcPts val="0"/>
+              </a:spcBef>
+              <a:spcAft>
+                <a:spcPts val="0"/>
+              </a:spcAft>
+              <a:buClr>
+                <a:srgbClr val="000000"/>
+              </a:buClr>
+              <a:buFont typeface="Arial"/>
               <a:buNone/>
             </a:pPr>
             <a:fld id="{00000000-1234-1234-1234-123412341234}" type="slidenum">
-              <a:rPr b="0" i="0" lang="en-US" sz="1200" u="none" cap="none" strike="noStrike">
-                <a:solidFill>
-                  <a:srgbClr val="888888"/>
-                </a:solidFill>
-                <a:latin typeface="Calibri"/>
-                <a:ea typeface="Calibri"/>
-                <a:cs typeface="Calibri"/>
-                <a:sym typeface="Calibri"/>
-              </a:rPr>
+              <a:rPr lang="en-US"/>
               <a:t>‹#›</a:t>
             </a:fld>
-            <a:endParaRPr b="0" i="0" sz="1200" u="none" cap="none" strike="noStrike">
-              <a:solidFill>
-                <a:srgbClr val="888888"/>
-              </a:solidFill>
-              <a:latin typeface="Calibri"/>
-              <a:ea typeface="Calibri"/>
-              <a:cs typeface="Calibri"/>
-              <a:sym typeface="Calibri"/>
-            </a:endParaRPr>
+            <a:endParaRPr/>
           </a:p>
         </p:txBody>
       </p:sp>
@@ -31368,7 +31986,7 @@
   <p:cSld>
     <p:spTree>
       <p:nvGrpSpPr>
-        <p:cNvPr id="416" name="Shape 416"/>
+        <p:cNvPr id="418" name="Shape 418"/>
         <p:cNvGrpSpPr/>
         <p:nvPr/>
       </p:nvGrpSpPr>
@@ -31382,7 +32000,7 @@
       </p:grpSpPr>
       <p:sp>
         <p:nvSpPr>
-          <p:cNvPr id="417" name="Shape 417"/>
+          <p:cNvPr id="419" name="Shape 419"/>
           <p:cNvSpPr txBox="1"/>
           <p:nvPr>
             <p:ph type="title"/>
@@ -31426,7 +32044,7 @@
             </a:pPr>
             <a:r>
               <a:rPr lang="en-US"/>
-              <a:t>Service-Catalog Status</a:t>
+              <a:t>Demo</a:t>
             </a:r>
             <a:endParaRPr/>
           </a:p>
@@ -31434,7 +32052,144 @@
       </p:sp>
       <p:sp>
         <p:nvSpPr>
-          <p:cNvPr id="418" name="Shape 418"/>
+          <p:cNvPr id="420" name="Shape 420"/>
+          <p:cNvSpPr txBox="1"/>
+          <p:nvPr>
+            <p:ph idx="12" type="sldNum"/>
+          </p:nvPr>
+        </p:nvSpPr>
+        <p:spPr>
+          <a:xfrm>
+            <a:off x="9067800" y="6400800"/>
+            <a:ext cx="2743200" cy="365100"/>
+          </a:xfrm>
+          <a:prstGeom prst="rect">
+            <a:avLst/>
+          </a:prstGeom>
+          <a:noFill/>
+          <a:ln>
+            <a:noFill/>
+          </a:ln>
+        </p:spPr>
+        <p:txBody>
+          <a:bodyPr anchorCtr="0" anchor="ctr" bIns="45700" lIns="91425" spcFirstLastPara="1" rIns="91425" wrap="square" tIns="45700">
+            <a:noAutofit/>
+          </a:bodyPr>
+          <a:lstStyle/>
+          <a:p>
+            <a:pPr indent="0" lvl="0" marL="0" marR="0" rtl="0" algn="r">
+              <a:spcBef>
+                <a:spcPts val="0"/>
+              </a:spcBef>
+              <a:spcAft>
+                <a:spcPts val="0"/>
+              </a:spcAft>
+              <a:buNone/>
+            </a:pPr>
+            <a:fld id="{00000000-1234-1234-1234-123412341234}" type="slidenum">
+              <a:rPr b="0" i="0" lang="en-US" sz="1200" u="none" cap="none" strike="noStrike">
+                <a:solidFill>
+                  <a:srgbClr val="888888"/>
+                </a:solidFill>
+                <a:latin typeface="Calibri"/>
+                <a:ea typeface="Calibri"/>
+                <a:cs typeface="Calibri"/>
+                <a:sym typeface="Calibri"/>
+              </a:rPr>
+              <a:t>‹#›</a:t>
+            </a:fld>
+            <a:endParaRPr b="0" i="0" sz="1200" u="none" cap="none" strike="noStrike">
+              <a:solidFill>
+                <a:srgbClr val="888888"/>
+              </a:solidFill>
+              <a:latin typeface="Calibri"/>
+              <a:ea typeface="Calibri"/>
+              <a:cs typeface="Calibri"/>
+              <a:sym typeface="Calibri"/>
+            </a:endParaRPr>
+          </a:p>
+        </p:txBody>
+      </p:sp>
+    </p:spTree>
+  </p:cSld>
+  <p:clrMapOvr>
+    <a:masterClrMapping/>
+  </p:clrMapOvr>
+</p:sld>
+</file>
+
+<file path=ppt/slides/slide31.xml><?xml version="1.0" encoding="utf-8"?>
+<p:sld xmlns:a="http://schemas.openxmlformats.org/drawingml/2006/main" xmlns:r="http://schemas.openxmlformats.org/officeDocument/2006/relationships" xmlns:mc="http://schemas.openxmlformats.org/markup-compatibility/2006" xmlns:mv="urn:schemas-microsoft-com:mac:vml" xmlns:p="http://schemas.openxmlformats.org/presentationml/2006/main" xmlns:c="http://schemas.openxmlformats.org/drawingml/2006/chart" xmlns:dgm="http://schemas.openxmlformats.org/drawingml/2006/diagram" xmlns:o="urn:schemas-microsoft-com:office:office" xmlns:v="urn:schemas-microsoft-com:vml" xmlns:pvml="urn:schemas-microsoft-com:office:powerpoint" xmlns:com="http://schemas.openxmlformats.org/drawingml/2006/compatibility" xmlns:p14="http://schemas.microsoft.com/office/powerpoint/2010/main" xmlns:p15="http://schemas.microsoft.com/office/powerpoint/2012/main">
+  <p:cSld>
+    <p:spTree>
+      <p:nvGrpSpPr>
+        <p:cNvPr id="424" name="Shape 424"/>
+        <p:cNvGrpSpPr/>
+        <p:nvPr/>
+      </p:nvGrpSpPr>
+      <p:grpSpPr>
+        <a:xfrm>
+          <a:off x="0" y="0"/>
+          <a:ext cx="0" cy="0"/>
+          <a:chOff x="0" y="0"/>
+          <a:chExt cx="0" cy="0"/>
+        </a:xfrm>
+      </p:grpSpPr>
+      <p:sp>
+        <p:nvSpPr>
+          <p:cNvPr id="425" name="Shape 425"/>
+          <p:cNvSpPr txBox="1"/>
+          <p:nvPr>
+            <p:ph type="title"/>
+          </p:nvPr>
+        </p:nvSpPr>
+        <p:spPr>
+          <a:xfrm>
+            <a:off x="1456840" y="0"/>
+            <a:ext cx="10735200" cy="1214400"/>
+          </a:xfrm>
+          <a:prstGeom prst="rect">
+            <a:avLst/>
+          </a:prstGeom>
+          <a:noFill/>
+          <a:ln>
+            <a:noFill/>
+          </a:ln>
+        </p:spPr>
+        <p:txBody>
+          <a:bodyPr anchorCtr="0" anchor="ctr" bIns="45700" lIns="91425" spcFirstLastPara="1" rIns="91425" wrap="square" tIns="45700">
+            <a:noAutofit/>
+          </a:bodyPr>
+          <a:lstStyle/>
+          <a:p>
+            <a:pPr indent="0" lvl="0" marL="0" marR="0" rtl="0" algn="l">
+              <a:lnSpc>
+                <a:spcPct val="90000"/>
+              </a:lnSpc>
+              <a:spcBef>
+                <a:spcPts val="0"/>
+              </a:spcBef>
+              <a:spcAft>
+                <a:spcPts val="0"/>
+              </a:spcAft>
+              <a:buClr>
+                <a:schemeClr val="lt1"/>
+              </a:buClr>
+              <a:buSzPts val="4400"/>
+              <a:buFont typeface="Calibri"/>
+              <a:buNone/>
+            </a:pPr>
+            <a:r>
+              <a:rPr lang="en-US"/>
+              <a:t>Service-Catalog Status</a:t>
+            </a:r>
+            <a:endParaRPr/>
+          </a:p>
+        </p:txBody>
+      </p:sp>
+      <p:sp>
+        <p:nvSpPr>
+          <p:cNvPr id="426" name="Shape 426"/>
           <p:cNvSpPr txBox="1"/>
           <p:nvPr>
             <p:ph idx="1" type="body"/>
@@ -31510,7 +32265,7 @@
       </p:sp>
       <p:sp>
         <p:nvSpPr>
-          <p:cNvPr id="419" name="Shape 419"/>
+          <p:cNvPr id="427" name="Shape 427"/>
           <p:cNvSpPr txBox="1"/>
           <p:nvPr>
             <p:ph idx="12" type="sldNum"/>
@@ -31576,12 +32331,12 @@
 </p:sld>
 </file>
 
-<file path=ppt/slides/slide31.xml><?xml version="1.0" encoding="utf-8"?>
+<file path=ppt/slides/slide32.xml><?xml version="1.0" encoding="utf-8"?>
 <p:sld xmlns:a="http://schemas.openxmlformats.org/drawingml/2006/main" xmlns:r="http://schemas.openxmlformats.org/officeDocument/2006/relationships" xmlns:mc="http://schemas.openxmlformats.org/markup-compatibility/2006" xmlns:mv="urn:schemas-microsoft-com:mac:vml" xmlns:p="http://schemas.openxmlformats.org/presentationml/2006/main" xmlns:c="http://schemas.openxmlformats.org/drawingml/2006/chart" xmlns:dgm="http://schemas.openxmlformats.org/drawingml/2006/diagram" xmlns:o="urn:schemas-microsoft-com:office:office" xmlns:v="urn:schemas-microsoft-com:vml" xmlns:pvml="urn:schemas-microsoft-com:office:powerpoint" xmlns:com="http://schemas.openxmlformats.org/drawingml/2006/compatibility" xmlns:p14="http://schemas.microsoft.com/office/powerpoint/2010/main" xmlns:p15="http://schemas.microsoft.com/office/powerpoint/2012/main">
   <p:cSld>
     <p:spTree>
       <p:nvGrpSpPr>
-        <p:cNvPr id="423" name="Shape 423"/>
+        <p:cNvPr id="431" name="Shape 431"/>
         <p:cNvGrpSpPr/>
         <p:nvPr/>
       </p:nvGrpSpPr>
@@ -31595,7 +32350,7 @@
       </p:grpSpPr>
       <p:sp>
         <p:nvSpPr>
-          <p:cNvPr id="424" name="Shape 424"/>
+          <p:cNvPr id="432" name="Shape 432"/>
           <p:cNvSpPr txBox="1"/>
           <p:nvPr>
             <p:ph type="title"/>
@@ -31651,7 +32406,7 @@
       </p:sp>
       <p:sp>
         <p:nvSpPr>
-          <p:cNvPr id="425" name="Shape 425"/>
+          <p:cNvPr id="433" name="Shape 433"/>
           <p:cNvSpPr txBox="1"/>
           <p:nvPr>
             <p:ph idx="1" type="body"/>
@@ -31695,7 +32450,7 @@
             </a:pPr>
             <a:r>
               <a:rPr lang="en-US"/>
-              <a:t>ICP uses actual Service-Catalog</a:t>
+              <a:t>IBM Cloud Private uses open source Service-Catalog</a:t>
             </a:r>
             <a:endParaRPr/>
           </a:p>
@@ -31719,7 +32474,7 @@
             </a:pPr>
             <a:r>
               <a:rPr lang="en-US"/>
-              <a:t>IBM Container Service uses custom implementation of the OSB API that supports  Docker, Cloud Foundry, Kubernetes</a:t>
+              <a:t>IBM Kubernetes Service uses closed-source implementation of the OSB API that supports  Docker, Cloud Foundry, Kubernetes simultaneously </a:t>
             </a:r>
             <a:endParaRPr/>
           </a:p>
@@ -31727,7 +32482,7 @@
       </p:sp>
       <p:sp>
         <p:nvSpPr>
-          <p:cNvPr id="426" name="Shape 426"/>
+          <p:cNvPr id="434" name="Shape 434"/>
           <p:cNvSpPr txBox="1"/>
           <p:nvPr>
             <p:ph idx="12" type="sldNum"/>
@@ -31793,12 +32548,12 @@
 </p:sld>
 </file>
 
-<file path=ppt/slides/slide32.xml><?xml version="1.0" encoding="utf-8"?>
+<file path=ppt/slides/slide33.xml><?xml version="1.0" encoding="utf-8"?>
 <p:sld xmlns:a="http://schemas.openxmlformats.org/drawingml/2006/main" xmlns:r="http://schemas.openxmlformats.org/officeDocument/2006/relationships" xmlns:mc="http://schemas.openxmlformats.org/markup-compatibility/2006" xmlns:mv="urn:schemas-microsoft-com:mac:vml" xmlns:p="http://schemas.openxmlformats.org/presentationml/2006/main" xmlns:c="http://schemas.openxmlformats.org/drawingml/2006/chart" xmlns:dgm="http://schemas.openxmlformats.org/drawingml/2006/diagram" xmlns:o="urn:schemas-microsoft-com:office:office" xmlns:v="urn:schemas-microsoft-com:vml" xmlns:pvml="urn:schemas-microsoft-com:office:powerpoint" xmlns:com="http://schemas.openxmlformats.org/drawingml/2006/compatibility" xmlns:p14="http://schemas.microsoft.com/office/powerpoint/2010/main" xmlns:p15="http://schemas.microsoft.com/office/powerpoint/2012/main">
   <p:cSld>
     <p:spTree>
       <p:nvGrpSpPr>
-        <p:cNvPr id="430" name="Shape 430"/>
+        <p:cNvPr id="438" name="Shape 438"/>
         <p:cNvGrpSpPr/>
         <p:nvPr/>
       </p:nvGrpSpPr>
@@ -31812,7 +32567,7 @@
       </p:grpSpPr>
       <p:sp>
         <p:nvSpPr>
-          <p:cNvPr id="431" name="Shape 431"/>
+          <p:cNvPr id="439" name="Shape 439"/>
           <p:cNvSpPr txBox="1"/>
           <p:nvPr>
             <p:ph type="title"/>
@@ -31864,7 +32619,7 @@
       </p:sp>
       <p:sp>
         <p:nvSpPr>
-          <p:cNvPr id="432" name="Shape 432"/>
+          <p:cNvPr id="440" name="Shape 440"/>
           <p:cNvSpPr txBox="1"/>
           <p:nvPr>
             <p:ph idx="12" type="sldNum"/>
@@ -32510,7 +33265,7 @@
             </a:pPr>
             <a:r>
               <a:rPr lang="en-US"/>
-              <a:t>A specific type of service offered under a Class, e.g. 100 MB MySQL Databases</a:t>
+              <a:t>A specific type of a Service that a Broker offers, e.g. 100 MB MySQL Databases</a:t>
             </a:r>
             <a:endParaRPr/>
           </a:p>

</xml_diff>